<commit_message>
Bug fix 2026 02 24 (#1240)
* Update sidenav.yaml

* Update 2026-02-20-manage-accessibility-risk-management.md

* Update sidenav.yaml

* Add files via upload
</commit_message>
<xml_diff>
--- a/assets/files/ICT-Accessibility-Risk-Asessment-Framework-(ITACM).pptx
+++ b/assets/files/ICT-Accessibility-Risk-Asessment-Framework-(ITACM).pptx
@@ -1054,267 +1054,7 @@
               </a:spcAft>
               <a:buNone/>
             </a:pPr>
-            <a:r>
-              <a:rPr lang="en"/>
-              <a:t>FY24 had 105 questions</a:t>
-            </a:r>
-            <a:endParaRPr/>
-          </a:p>
-          <a:p>
-            <a:pPr marL="0" lvl="0" indent="0" algn="l" rtl="0">
-              <a:spcBef>
-                <a:spcPts val="0"/>
-              </a:spcBef>
-              <a:spcAft>
-                <a:spcPts val="0"/>
-              </a:spcAft>
-              <a:buNone/>
-            </a:pPr>
-            <a:endParaRPr/>
-          </a:p>
-          <a:p>
-            <a:pPr marL="0" lvl="0" indent="0" algn="l" rtl="0">
-              <a:lnSpc>
-                <a:spcPct val="115000"/>
-              </a:lnSpc>
-              <a:spcBef>
-                <a:spcPts val="0"/>
-              </a:spcBef>
-              <a:spcAft>
-                <a:spcPts val="0"/>
-              </a:spcAft>
-              <a:buClr>
-                <a:schemeClr val="dk1"/>
-              </a:buClr>
-              <a:buSzPts val="1100"/>
-              <a:buFont typeface="Arial"/>
-              <a:buNone/>
-            </a:pPr>
-            <a:r>
-              <a:rPr lang="en" sz="1600">
-                <a:solidFill>
-                  <a:srgbClr val="003C71"/>
-                </a:solidFill>
-                <a:latin typeface="Public Sans"/>
-                <a:ea typeface="Public Sans"/>
-                <a:cs typeface="Public Sans"/>
-                <a:sym typeface="Public Sans"/>
-              </a:rPr>
-              <a:t>In previous assessments, </a:t>
-            </a:r>
-            <a:r>
-              <a:rPr lang="en" sz="1600" b="1">
-                <a:solidFill>
-                  <a:srgbClr val="003C71"/>
-                </a:solidFill>
-                <a:latin typeface="Public Sans"/>
-                <a:ea typeface="Public Sans"/>
-                <a:cs typeface="Public Sans"/>
-                <a:sym typeface="Public Sans"/>
-              </a:rPr>
-              <a:t>agencies </a:t>
-            </a:r>
-            <a:r>
-              <a:rPr lang="en" sz="1600">
-                <a:solidFill>
-                  <a:srgbClr val="003C71"/>
-                </a:solidFill>
-                <a:latin typeface="Public Sans"/>
-                <a:ea typeface="Public Sans"/>
-                <a:cs typeface="Public Sans"/>
-                <a:sym typeface="Public Sans"/>
-              </a:rPr>
-              <a:t>and</a:t>
-            </a:r>
-            <a:r>
-              <a:rPr lang="en" sz="1600" b="1">
-                <a:solidFill>
-                  <a:srgbClr val="003C71"/>
-                </a:solidFill>
-                <a:latin typeface="Public Sans"/>
-                <a:ea typeface="Public Sans"/>
-                <a:cs typeface="Public Sans"/>
-                <a:sym typeface="Public Sans"/>
-              </a:rPr>
-              <a:t> components </a:t>
-            </a:r>
-            <a:r>
-              <a:rPr lang="en" sz="1600">
-                <a:solidFill>
-                  <a:srgbClr val="003C71"/>
-                </a:solidFill>
-                <a:latin typeface="Public Sans"/>
-                <a:ea typeface="Public Sans"/>
-                <a:cs typeface="Public Sans"/>
-                <a:sym typeface="Public Sans"/>
-              </a:rPr>
-              <a:t>responded to the same criteria. </a:t>
-            </a:r>
-            <a:endParaRPr sz="1600">
-              <a:solidFill>
-                <a:srgbClr val="003C71"/>
-              </a:solidFill>
-              <a:latin typeface="Public Sans"/>
-              <a:ea typeface="Public Sans"/>
-              <a:cs typeface="Public Sans"/>
-              <a:sym typeface="Public Sans"/>
-            </a:endParaRPr>
-          </a:p>
-          <a:p>
-            <a:pPr marL="0" lvl="0" indent="0" algn="l" rtl="0">
-              <a:lnSpc>
-                <a:spcPct val="115000"/>
-              </a:lnSpc>
-              <a:spcBef>
-                <a:spcPts val="1200"/>
-              </a:spcBef>
-              <a:spcAft>
-                <a:spcPts val="0"/>
-              </a:spcAft>
-              <a:buClr>
-                <a:schemeClr val="dk1"/>
-              </a:buClr>
-              <a:buSzPts val="1100"/>
-              <a:buFont typeface="Arial"/>
-              <a:buNone/>
-            </a:pPr>
-            <a:r>
-              <a:rPr lang="en" sz="1600">
-                <a:solidFill>
-                  <a:srgbClr val="003C71"/>
-                </a:solidFill>
-                <a:latin typeface="Public Sans"/>
-                <a:ea typeface="Public Sans"/>
-                <a:cs typeface="Public Sans"/>
-                <a:sym typeface="Public Sans"/>
-              </a:rPr>
-              <a:t>This year, </a:t>
-            </a:r>
-            <a:r>
-              <a:rPr lang="en" sz="1600" b="1">
-                <a:solidFill>
-                  <a:srgbClr val="003C71"/>
-                </a:solidFill>
-                <a:latin typeface="Public Sans"/>
-                <a:ea typeface="Public Sans"/>
-                <a:cs typeface="Public Sans"/>
-                <a:sym typeface="Public Sans"/>
-              </a:rPr>
-              <a:t>parent-level agencies </a:t>
-            </a:r>
-            <a:r>
-              <a:rPr lang="en" sz="1600">
-                <a:solidFill>
-                  <a:srgbClr val="003C71"/>
-                </a:solidFill>
-                <a:latin typeface="Public Sans"/>
-                <a:ea typeface="Public Sans"/>
-                <a:cs typeface="Public Sans"/>
-                <a:sym typeface="Public Sans"/>
-              </a:rPr>
-              <a:t>included </a:t>
-            </a:r>
-            <a:r>
-              <a:rPr lang="en" sz="1600" b="1">
-                <a:solidFill>
-                  <a:srgbClr val="003C71"/>
-                </a:solidFill>
-                <a:latin typeface="Public Sans"/>
-                <a:ea typeface="Public Sans"/>
-                <a:cs typeface="Public Sans"/>
-                <a:sym typeface="Public Sans"/>
-              </a:rPr>
-              <a:t>component </a:t>
-            </a:r>
-            <a:r>
-              <a:rPr lang="en" sz="1600">
-                <a:solidFill>
-                  <a:srgbClr val="003C71"/>
-                </a:solidFill>
-                <a:latin typeface="Public Sans"/>
-                <a:ea typeface="Public Sans"/>
-                <a:cs typeface="Public Sans"/>
-                <a:sym typeface="Public Sans"/>
-              </a:rPr>
-              <a:t>data in their submissions. </a:t>
-            </a:r>
-            <a:endParaRPr sz="1600">
-              <a:solidFill>
-                <a:srgbClr val="003C71"/>
-              </a:solidFill>
-              <a:latin typeface="Public Sans"/>
-              <a:ea typeface="Public Sans"/>
-              <a:cs typeface="Public Sans"/>
-              <a:sym typeface="Public Sans"/>
-            </a:endParaRPr>
-          </a:p>
-          <a:p>
-            <a:pPr marL="0" lvl="0" indent="0" algn="l" rtl="0">
-              <a:lnSpc>
-                <a:spcPct val="115000"/>
-              </a:lnSpc>
-              <a:spcBef>
-                <a:spcPts val="1200"/>
-              </a:spcBef>
-              <a:spcAft>
-                <a:spcPts val="1200"/>
-              </a:spcAft>
-              <a:buClr>
-                <a:schemeClr val="dk1"/>
-              </a:buClr>
-              <a:buSzPts val="1100"/>
-              <a:buFont typeface="Arial"/>
-              <a:buNone/>
-            </a:pPr>
-            <a:r>
-              <a:rPr lang="en" sz="1600" b="1">
-                <a:solidFill>
-                  <a:srgbClr val="003C71"/>
-                </a:solidFill>
-                <a:latin typeface="Public Sans"/>
-                <a:ea typeface="Public Sans"/>
-                <a:cs typeface="Public Sans"/>
-                <a:sym typeface="Public Sans"/>
-              </a:rPr>
-              <a:t>Components</a:t>
-            </a:r>
-            <a:r>
-              <a:rPr lang="en" sz="1600">
-                <a:solidFill>
-                  <a:srgbClr val="003C71"/>
-                </a:solidFill>
-                <a:latin typeface="Public Sans"/>
-                <a:ea typeface="Public Sans"/>
-                <a:cs typeface="Public Sans"/>
-                <a:sym typeface="Public Sans"/>
-              </a:rPr>
-              <a:t> answered questions only from the perspective of their component and had the option to answer questions under the Acquisition and Procurement and Testing and Remediation categories only if components performed those activities independently or in addition to their </a:t>
-            </a:r>
-            <a:r>
-              <a:rPr lang="en" sz="1600" b="1">
-                <a:solidFill>
-                  <a:srgbClr val="003C71"/>
-                </a:solidFill>
-                <a:latin typeface="Public Sans"/>
-                <a:ea typeface="Public Sans"/>
-                <a:cs typeface="Public Sans"/>
-                <a:sym typeface="Public Sans"/>
-              </a:rPr>
-              <a:t>parent agency</a:t>
-            </a:r>
-            <a:r>
-              <a:rPr lang="en" sz="1600">
-                <a:solidFill>
-                  <a:srgbClr val="003C71"/>
-                </a:solidFill>
-                <a:latin typeface="Public Sans"/>
-                <a:ea typeface="Public Sans"/>
-                <a:cs typeface="Public Sans"/>
-                <a:sym typeface="Public Sans"/>
-              </a:rPr>
-              <a:t>.</a:t>
-            </a:r>
-            <a:endParaRPr/>
+            <a:endParaRPr dirty="0"/>
           </a:p>
         </p:txBody>
       </p:sp>
@@ -1527,27 +1267,11 @@
               <a:buFont typeface="Arial"/>
               <a:buNone/>
             </a:pPr>
-            <a:endParaRPr>
+            <a:endParaRPr dirty="0">
               <a:solidFill>
                 <a:schemeClr val="dk1"/>
               </a:solidFill>
             </a:endParaRPr>
-          </a:p>
-          <a:p>
-            <a:pPr marL="0" lvl="0" indent="0" algn="l" rtl="0">
-              <a:spcBef>
-                <a:spcPts val="0"/>
-              </a:spcBef>
-              <a:spcAft>
-                <a:spcPts val="0"/>
-              </a:spcAft>
-              <a:buNone/>
-            </a:pPr>
-            <a:r>
-              <a:rPr lang="en"/>
-              <a:t>@Laura</a:t>
-            </a:r>
-            <a:endParaRPr/>
           </a:p>
         </p:txBody>
       </p:sp>
@@ -2860,27 +2584,7 @@
               </a:spcAft>
               <a:buNone/>
             </a:pPr>
-            <a:r>
-              <a:rPr lang="en"/>
-              <a:t>10 min for each attendee to work their individual example</a:t>
-            </a:r>
-            <a:endParaRPr/>
-          </a:p>
-          <a:p>
-            <a:pPr marL="0" lvl="0" indent="0" algn="l" rtl="0">
-              <a:spcBef>
-                <a:spcPts val="0"/>
-              </a:spcBef>
-              <a:spcAft>
-                <a:spcPts val="0"/>
-              </a:spcAft>
-              <a:buNone/>
-            </a:pPr>
-            <a:r>
-              <a:rPr lang="en"/>
-              <a:t>20 min for 2-3 volunteers to share</a:t>
-            </a:r>
-            <a:endParaRPr/>
+            <a:endParaRPr dirty="0"/>
           </a:p>
         </p:txBody>
       </p:sp>
@@ -3341,27 +3045,11 @@
               <a:buFont typeface="Arial"/>
               <a:buNone/>
             </a:pPr>
-            <a:endParaRPr>
+            <a:endParaRPr dirty="0">
               <a:solidFill>
                 <a:schemeClr val="dk1"/>
               </a:solidFill>
             </a:endParaRPr>
-          </a:p>
-          <a:p>
-            <a:pPr marL="0" lvl="0" indent="0" algn="l" rtl="0">
-              <a:spcBef>
-                <a:spcPts val="0"/>
-              </a:spcBef>
-              <a:spcAft>
-                <a:spcPts val="0"/>
-              </a:spcAft>
-              <a:buNone/>
-            </a:pPr>
-            <a:r>
-              <a:rPr lang="en"/>
-              <a:t>@Laura</a:t>
-            </a:r>
-            <a:endParaRPr/>
           </a:p>
         </p:txBody>
       </p:sp>
@@ -3470,15 +3158,7 @@
               <a:buFont typeface="Arial"/>
               <a:buNone/>
             </a:pPr>
-            <a:r>
-              <a:rPr lang="en">
-                <a:solidFill>
-                  <a:schemeClr val="dk1"/>
-                </a:solidFill>
-              </a:rPr>
-              <a:t>245 respondents in FY24</a:t>
-            </a:r>
-            <a:endParaRPr>
+            <a:endParaRPr dirty="0">
               <a:solidFill>
                 <a:schemeClr val="dk1"/>
               </a:solidFill>
@@ -3492,18 +3172,9 @@
               <a:spcAft>
                 <a:spcPts val="0"/>
               </a:spcAft>
-              <a:buClr>
-                <a:schemeClr val="dk1"/>
-              </a:buClr>
-              <a:buSzPts val="1100"/>
-              <a:buFont typeface="Arial"/>
               <a:buNone/>
             </a:pPr>
-            <a:endParaRPr>
-              <a:solidFill>
-                <a:schemeClr val="dk1"/>
-              </a:solidFill>
-            </a:endParaRPr>
+            <a:endParaRPr dirty="0"/>
           </a:p>
           <a:p>
             <a:pPr marL="0" lvl="0" indent="0" algn="l" rtl="0">
@@ -3513,26 +3184,9 @@
               <a:spcAft>
                 <a:spcPts val="0"/>
               </a:spcAft>
-              <a:buClr>
-                <a:schemeClr val="dk1"/>
-              </a:buClr>
-              <a:buSzPts val="1100"/>
-              <a:buFont typeface="Arial"/>
               <a:buNone/>
             </a:pPr>
-            <a:r>
-              <a:rPr lang="en">
-                <a:solidFill>
-                  <a:schemeClr val="dk1"/>
-                </a:solidFill>
-              </a:rPr>
-              <a:t>43 agencies on A-11 did not submit, including 2 CFO act agencies. Several components did not submit either</a:t>
-            </a:r>
-            <a:endParaRPr>
-              <a:solidFill>
-                <a:schemeClr val="dk1"/>
-              </a:solidFill>
-            </a:endParaRPr>
+            <a:endParaRPr dirty="0"/>
           </a:p>
           <a:p>
             <a:pPr marL="0" lvl="0" indent="0" algn="l" rtl="0">
@@ -3542,18 +3196,9 @@
               <a:spcAft>
                 <a:spcPts val="0"/>
               </a:spcAft>
-              <a:buClr>
-                <a:schemeClr val="dk1"/>
-              </a:buClr>
-              <a:buSzPts val="1100"/>
-              <a:buFont typeface="Arial"/>
               <a:buNone/>
             </a:pPr>
-            <a:endParaRPr>
-              <a:solidFill>
-                <a:schemeClr val="dk1"/>
-              </a:solidFill>
-            </a:endParaRPr>
+            <a:endParaRPr dirty="0"/>
           </a:p>
           <a:p>
             <a:pPr marL="0" lvl="0" indent="0" algn="l" rtl="0">
@@ -3565,46 +3210,10 @@
               </a:spcAft>
               <a:buNone/>
             </a:pPr>
-            <a:endParaRPr/>
-          </a:p>
-          <a:p>
-            <a:pPr marL="0" lvl="0" indent="0" algn="l" rtl="0">
-              <a:spcBef>
-                <a:spcPts val="0"/>
-              </a:spcBef>
-              <a:spcAft>
-                <a:spcPts val="0"/>
-              </a:spcAft>
-              <a:buNone/>
-            </a:pPr>
-            <a:endParaRPr/>
-          </a:p>
-          <a:p>
-            <a:pPr marL="0" lvl="0" indent="0" algn="l" rtl="0">
-              <a:spcBef>
-                <a:spcPts val="0"/>
-              </a:spcBef>
-              <a:spcAft>
-                <a:spcPts val="0"/>
-              </a:spcAft>
-              <a:buNone/>
-            </a:pPr>
-            <a:endParaRPr/>
-          </a:p>
-          <a:p>
-            <a:pPr marL="0" lvl="0" indent="0" algn="l" rtl="0">
-              <a:spcBef>
-                <a:spcPts val="0"/>
-              </a:spcBef>
-              <a:spcAft>
-                <a:spcPts val="0"/>
-              </a:spcAft>
-              <a:buNone/>
-            </a:pPr>
             <a:br>
-              <a:rPr lang="en"/>
+              <a:rPr lang="en" dirty="0"/>
             </a:br>
-            <a:endParaRPr sz="1200">
+            <a:endParaRPr sz="1200" dirty="0">
               <a:solidFill>
                 <a:srgbClr val="1B1B1B"/>
               </a:solidFill>
@@ -3635,7 +3244,7 @@
               <a:buFont typeface="Arial"/>
               <a:buNone/>
             </a:pPr>
-            <a:endParaRPr sz="1200">
+            <a:endParaRPr sz="1200" dirty="0">
               <a:solidFill>
                 <a:srgbClr val="1B1B1B"/>
               </a:solidFill>
@@ -3658,7 +3267,7 @@
               </a:spcAft>
               <a:buNone/>
             </a:pPr>
-            <a:endParaRPr/>
+            <a:endParaRPr dirty="0"/>
           </a:p>
         </p:txBody>
       </p:sp>
@@ -3864,90 +3473,9 @@
               <a:spcAft>
                 <a:spcPts val="0"/>
               </a:spcAft>
-              <a:buClr>
-                <a:schemeClr val="dk1"/>
-              </a:buClr>
-              <a:buSzPts val="1100"/>
-              <a:buFont typeface="Arial"/>
               <a:buNone/>
             </a:pPr>
-            <a:endParaRPr>
-              <a:solidFill>
-                <a:schemeClr val="dk1"/>
-              </a:solidFill>
-            </a:endParaRPr>
-          </a:p>
-          <a:p>
-            <a:pPr marL="0" lvl="0" indent="0" algn="l" rtl="0">
-              <a:spcBef>
-                <a:spcPts val="0"/>
-              </a:spcBef>
-              <a:spcAft>
-                <a:spcPts val="0"/>
-              </a:spcAft>
-              <a:buNone/>
-            </a:pPr>
-            <a:r>
-              <a:rPr lang="en"/>
-              <a:t>@Laura</a:t>
-            </a:r>
-            <a:endParaRPr/>
-          </a:p>
-          <a:p>
-            <a:pPr marL="0" lvl="0" indent="0" algn="l" rtl="0">
-              <a:spcBef>
-                <a:spcPts val="0"/>
-              </a:spcBef>
-              <a:spcAft>
-                <a:spcPts val="0"/>
-              </a:spcAft>
-              <a:buNone/>
-            </a:pPr>
-            <a:endParaRPr/>
-          </a:p>
-          <a:p>
-            <a:pPr marL="0" lvl="0" indent="0" algn="l" rtl="0">
-              <a:spcBef>
-                <a:spcPts val="0"/>
-              </a:spcBef>
-              <a:spcAft>
-                <a:spcPts val="0"/>
-              </a:spcAft>
-              <a:buNone/>
-            </a:pPr>
-            <a:r>
-              <a:rPr lang="en"/>
-              <a:t>as you go step by step through the framework, suggest presenting an real world example to support audience understanding - "let's use a web application as an example"</a:t>
-            </a:r>
-            <a:endParaRPr/>
-          </a:p>
-          <a:p>
-            <a:pPr marL="0" lvl="0" indent="0" algn="l" rtl="0">
-              <a:spcBef>
-                <a:spcPts val="0"/>
-              </a:spcBef>
-              <a:spcAft>
-                <a:spcPts val="0"/>
-              </a:spcAft>
-              <a:buNone/>
-            </a:pPr>
-            <a:r>
-              <a:rPr lang="en"/>
-              <a:t>Yes, that makes sense. Go through the questions and then respond to them with a real world example.</a:t>
-            </a:r>
-            <a:endParaRPr/>
-          </a:p>
-          <a:p>
-            <a:pPr marL="0" lvl="0" indent="0" algn="l" rtl="0">
-              <a:spcBef>
-                <a:spcPts val="0"/>
-              </a:spcBef>
-              <a:spcAft>
-                <a:spcPts val="0"/>
-              </a:spcAft>
-              <a:buNone/>
-            </a:pPr>
-            <a:endParaRPr/>
+            <a:endParaRPr dirty="0"/>
           </a:p>
         </p:txBody>
       </p:sp>

</xml_diff>